<commit_message>
Add diagrams to `control/slides`
</commit_message>
<xml_diff>
--- a/phase-2/control/slides/control.pptx
+++ b/phase-2/control/slides/control.pptx
@@ -3917,7 +3917,7 @@
       </p:grpSpPr>
       <p:sp>
         <p:nvSpPr>
-          <p:cNvPr id="151" name="Sakib Rasul | Created August 2, 2023"/>
+          <p:cNvPr id="151" name="Sakib Rasul | Updated January 31, 2024 | Created August 2, 2023"/>
           <p:cNvSpPr txBox="1"/>
           <p:nvPr>
             <p:ph type="body" idx="21"/>
@@ -3939,7 +3939,7 @@
           <a:p>
             <a:pPr/>
             <a:r>
-              <a:t>Sakib Rasul | Created August 2, 2023</a:t>
+              <a:t>Sakib Rasul | Updated January 31, 2024 | Created August 2, 2023</a:t>
             </a:r>
           </a:p>
         </p:txBody>
@@ -3970,7 +3970,7 @@
       </p:sp>
       <p:sp>
         <p:nvSpPr>
-          <p:cNvPr id="153" name="Phase 2 // Week 1, Day 3"/>
+          <p:cNvPr id="153" name="Phase 2 | Week 1, Lesson 3"/>
           <p:cNvSpPr txBox="1"/>
           <p:nvPr>
             <p:ph type="subTitle" sz="quarter" idx="1"/>
@@ -3987,7 +3987,7 @@
           <a:p>
             <a:pPr/>
             <a:r>
-              <a:t>Phase 2 // Week 1, Day 3</a:t>
+              <a:t>Phase 2 | Week 1, Lesson 3</a:t>
             </a:r>
           </a:p>
         </p:txBody>
@@ -4529,6 +4529,12 @@
           <a:p>
             <a:pPr lvl="1"/>
             <a:r>
+              <a:t>Some of the child’s behavior is dictated by an ancestor.</a:t>
+            </a:r>
+          </a:p>
+          <a:p>
+            <a:pPr lvl="1"/>
+            <a:r>
               <a:t>The child is </a:t>
             </a:r>
             <a:r>
@@ -4536,7 +4542,14 @@
               <a:t>driven by props</a:t>
             </a:r>
             <a:r>
-              <a:t>, as opposed to being driven by state.</a:t>
+              <a:t>, as opposed to being </a:t>
+            </a:r>
+            <a:r>
+              <a:rPr u="sng"/>
+              <a:t>driven by state*</a:t>
+            </a:r>
+            <a:r>
+              <a:t>.</a:t>
             </a:r>
           </a:p>
           <a:p>
@@ -4604,6 +4617,379 @@
           </a:p>
         </p:txBody>
       </p:sp>
+      <p:sp>
+        <p:nvSpPr>
+          <p:cNvPr id="164" name="*When we say “driven by state”, we mean driven by things internal to a component, including information not managed with useState()."/>
+          <p:cNvSpPr txBox="1"/>
+          <p:nvPr/>
+        </p:nvSpPr>
+        <p:spPr>
+          <a:xfrm>
+            <a:off x="2723391" y="12833264"/>
+            <a:ext cx="18937218" cy="487975"/>
+          </a:xfrm>
+          <a:prstGeom prst="rect">
+            <a:avLst/>
+          </a:prstGeom>
+          <a:ln w="12700">
+            <a:miter lim="400000"/>
+          </a:ln>
+          <a:extLst>
+            <a:ext uri="{C572A759-6A51-4108-AA02-DFA0A04FC94B}">
+              <ma14:wrappingTextBoxFlag xmlns:ma14="http://schemas.microsoft.com/office/mac/drawingml/2011/main" val="1"/>
+            </a:ext>
+          </a:extLst>
+        </p:spPr>
+        <p:txBody>
+          <a:bodyPr wrap="none" lIns="50800" tIns="50800" rIns="50800" bIns="50800" anchor="ctr">
+            <a:spAutoFit/>
+          </a:bodyPr>
+          <a:lstStyle/>
+          <a:p>
+            <a:pPr/>
+            <a:r>
+              <a:t>*When we say “driven by state”, we mean driven by things </a:t>
+            </a:r>
+            <a:r>
+              <a:rPr u="sng"/>
+              <a:t>internal</a:t>
+            </a:r>
+            <a:r>
+              <a:t> to a component, including information not managed with </a:t>
+            </a:r>
+            <a:r>
+              <a:rPr>
+                <a:latin typeface="Courier New"/>
+                <a:ea typeface="Courier New"/>
+                <a:cs typeface="Courier New"/>
+                <a:sym typeface="Courier New"/>
+              </a:rPr>
+              <a:t>useState()</a:t>
+            </a:r>
+            <a:r>
+              <a:t>.</a:t>
+            </a:r>
+          </a:p>
+        </p:txBody>
+      </p:sp>
+      <p:sp>
+        <p:nvSpPr>
+          <p:cNvPr id="165" name="Child"/>
+          <p:cNvSpPr/>
+          <p:nvPr/>
+        </p:nvSpPr>
+        <p:spPr>
+          <a:xfrm>
+            <a:off x="18219130" y="9263290"/>
+            <a:ext cx="1524001" cy="762001"/>
+          </a:xfrm>
+          <a:custGeom>
+            <a:avLst/>
+            <a:gdLst/>
+            <a:ahLst/>
+            <a:cxnLst>
+              <a:cxn ang="0">
+                <a:pos x="wd2" y="hd2"/>
+              </a:cxn>
+              <a:cxn ang="5400000">
+                <a:pos x="wd2" y="hd2"/>
+              </a:cxn>
+              <a:cxn ang="10800000">
+                <a:pos x="wd2" y="hd2"/>
+              </a:cxn>
+              <a:cxn ang="16200000">
+                <a:pos x="wd2" y="hd2"/>
+              </a:cxn>
+            </a:cxnLst>
+            <a:rect l="0" t="0" r="r" b="b"/>
+            <a:pathLst>
+              <a:path w="21600" h="21600" fill="norm" stroke="1" extrusionOk="0">
+                <a:moveTo>
+                  <a:pt x="5400" y="0"/>
+                </a:moveTo>
+                <a:cubicBezTo>
+                  <a:pt x="2418" y="0"/>
+                  <a:pt x="0" y="4835"/>
+                  <a:pt x="0" y="10800"/>
+                </a:cubicBezTo>
+                <a:cubicBezTo>
+                  <a:pt x="0" y="16765"/>
+                  <a:pt x="2418" y="21600"/>
+                  <a:pt x="5400" y="21600"/>
+                </a:cubicBezTo>
+                <a:lnTo>
+                  <a:pt x="16200" y="21600"/>
+                </a:lnTo>
+                <a:cubicBezTo>
+                  <a:pt x="19182" y="21600"/>
+                  <a:pt x="21600" y="16765"/>
+                  <a:pt x="21600" y="10800"/>
+                </a:cubicBezTo>
+                <a:cubicBezTo>
+                  <a:pt x="21600" y="4835"/>
+                  <a:pt x="19182" y="0"/>
+                  <a:pt x="16200" y="0"/>
+                </a:cubicBezTo>
+                <a:lnTo>
+                  <a:pt x="5400" y="0"/>
+                </a:lnTo>
+                <a:close/>
+              </a:path>
+            </a:pathLst>
+          </a:custGeom>
+          <a:solidFill>
+            <a:srgbClr val="FFFFFF"/>
+          </a:solidFill>
+          <a:ln w="12700">
+            <a:miter lim="400000"/>
+          </a:ln>
+          <a:extLst>
+            <a:ext uri="{C572A759-6A51-4108-AA02-DFA0A04FC94B}">
+              <ma14:wrappingTextBoxFlag xmlns:ma14="http://schemas.microsoft.com/office/mac/drawingml/2011/main" val="1"/>
+            </a:ext>
+          </a:extLst>
+        </p:spPr>
+        <p:txBody>
+          <a:bodyPr lIns="50800" tIns="50800" rIns="50800" bIns="50800" anchor="ctr"/>
+          <a:lstStyle>
+            <a:lvl1pPr defTabSz="825500">
+              <a:defRPr sz="3200">
+                <a:solidFill>
+                  <a:srgbClr val="000000"/>
+                </a:solidFill>
+                <a:latin typeface="Helvetica Neue Medium"/>
+                <a:ea typeface="Helvetica Neue Medium"/>
+                <a:cs typeface="Helvetica Neue Medium"/>
+                <a:sym typeface="Helvetica Neue Medium"/>
+              </a:defRPr>
+            </a:lvl1pPr>
+          </a:lstStyle>
+          <a:p>
+            <a:pPr/>
+            <a:r>
+              <a:t>Child</a:t>
+            </a:r>
+          </a:p>
+        </p:txBody>
+      </p:sp>
+      <p:sp>
+        <p:nvSpPr>
+          <p:cNvPr id="166" name="Ancestor"/>
+          <p:cNvSpPr/>
+          <p:nvPr/>
+        </p:nvSpPr>
+        <p:spPr>
+          <a:xfrm>
+            <a:off x="17550235" y="6504952"/>
+            <a:ext cx="2861790" cy="1216262"/>
+          </a:xfrm>
+          <a:custGeom>
+            <a:avLst/>
+            <a:gdLst/>
+            <a:ahLst/>
+            <a:cxnLst>
+              <a:cxn ang="0">
+                <a:pos x="wd2" y="hd2"/>
+              </a:cxn>
+              <a:cxn ang="5400000">
+                <a:pos x="wd2" y="hd2"/>
+              </a:cxn>
+              <a:cxn ang="10800000">
+                <a:pos x="wd2" y="hd2"/>
+              </a:cxn>
+              <a:cxn ang="16200000">
+                <a:pos x="wd2" y="hd2"/>
+              </a:cxn>
+            </a:cxnLst>
+            <a:rect l="0" t="0" r="r" b="b"/>
+            <a:pathLst>
+              <a:path w="21600" h="21600" fill="norm" stroke="1" extrusionOk="0">
+                <a:moveTo>
+                  <a:pt x="2972" y="0"/>
+                </a:moveTo>
+                <a:lnTo>
+                  <a:pt x="0" y="21600"/>
+                </a:lnTo>
+                <a:lnTo>
+                  <a:pt x="21600" y="21600"/>
+                </a:lnTo>
+                <a:lnTo>
+                  <a:pt x="18627" y="0"/>
+                </a:lnTo>
+                <a:lnTo>
+                  <a:pt x="2972" y="0"/>
+                </a:lnTo>
+                <a:close/>
+              </a:path>
+            </a:pathLst>
+          </a:custGeom>
+          <a:solidFill>
+            <a:srgbClr val="FFFFFF"/>
+          </a:solidFill>
+          <a:ln w="12700">
+            <a:miter lim="400000"/>
+          </a:ln>
+          <a:extLst>
+            <a:ext uri="{C572A759-6A51-4108-AA02-DFA0A04FC94B}">
+              <ma14:wrappingTextBoxFlag xmlns:ma14="http://schemas.microsoft.com/office/mac/drawingml/2011/main" val="1"/>
+            </a:ext>
+          </a:extLst>
+        </p:spPr>
+        <p:txBody>
+          <a:bodyPr lIns="50800" tIns="50800" rIns="50800" bIns="50800" anchor="ctr"/>
+          <a:lstStyle>
+            <a:lvl1pPr defTabSz="825500">
+              <a:defRPr sz="3200">
+                <a:solidFill>
+                  <a:srgbClr val="000000"/>
+                </a:solidFill>
+                <a:latin typeface="Helvetica Neue Medium"/>
+                <a:ea typeface="Helvetica Neue Medium"/>
+                <a:cs typeface="Helvetica Neue Medium"/>
+                <a:sym typeface="Helvetica Neue Medium"/>
+              </a:defRPr>
+            </a:lvl1pPr>
+          </a:lstStyle>
+          <a:p>
+            <a:pPr/>
+            <a:r>
+              <a:t>Ancestor</a:t>
+            </a:r>
+          </a:p>
+        </p:txBody>
+      </p:sp>
+      <p:sp>
+        <p:nvSpPr>
+          <p:cNvPr id="167" name="Arrow"/>
+          <p:cNvSpPr/>
+          <p:nvPr/>
+        </p:nvSpPr>
+        <p:spPr>
+          <a:xfrm rot="5393452">
+            <a:off x="18218262" y="8206982"/>
+            <a:ext cx="1525429" cy="566919"/>
+          </a:xfrm>
+          <a:prstGeom prst="rightArrow">
+            <a:avLst>
+              <a:gd name="adj1" fmla="val 19930"/>
+              <a:gd name="adj2" fmla="val 126390"/>
+            </a:avLst>
+          </a:prstGeom>
+          <a:solidFill>
+            <a:schemeClr val="accent6"/>
+          </a:solidFill>
+          <a:ln w="12700">
+            <a:miter lim="400000"/>
+          </a:ln>
+        </p:spPr>
+        <p:txBody>
+          <a:bodyPr lIns="50800" tIns="50800" rIns="50800" bIns="50800" anchor="ctr"/>
+          <a:lstStyle/>
+          <a:p>
+            <a:pPr defTabSz="825500">
+              <a:defRPr sz="3200">
+                <a:solidFill>
+                  <a:srgbClr val="000000"/>
+                </a:solidFill>
+                <a:latin typeface="Helvetica Neue Medium"/>
+                <a:ea typeface="Helvetica Neue Medium"/>
+                <a:cs typeface="Helvetica Neue Medium"/>
+                <a:sym typeface="Helvetica Neue Medium"/>
+              </a:defRPr>
+            </a:pPr>
+          </a:p>
+        </p:txBody>
+      </p:sp>
+      <p:sp>
+        <p:nvSpPr>
+          <p:cNvPr id="168" name="function"/>
+          <p:cNvSpPr/>
+          <p:nvPr/>
+        </p:nvSpPr>
+        <p:spPr>
+          <a:xfrm>
+            <a:off x="19177172" y="7928460"/>
+            <a:ext cx="2252638" cy="1123855"/>
+          </a:xfrm>
+          <a:custGeom>
+            <a:avLst/>
+            <a:gdLst/>
+            <a:ahLst/>
+            <a:cxnLst>
+              <a:cxn ang="0">
+                <a:pos x="wd2" y="hd2"/>
+              </a:cxn>
+              <a:cxn ang="5400000">
+                <a:pos x="wd2" y="hd2"/>
+              </a:cxn>
+              <a:cxn ang="10800000">
+                <a:pos x="wd2" y="hd2"/>
+              </a:cxn>
+              <a:cxn ang="16200000">
+                <a:pos x="wd2" y="hd2"/>
+              </a:cxn>
+            </a:cxnLst>
+            <a:rect l="0" t="0" r="r" b="b"/>
+            <a:pathLst>
+              <a:path w="21600" h="21600" fill="norm" stroke="1" extrusionOk="0">
+                <a:moveTo>
+                  <a:pt x="10800" y="0"/>
+                </a:moveTo>
+                <a:lnTo>
+                  <a:pt x="0" y="10800"/>
+                </a:lnTo>
+                <a:lnTo>
+                  <a:pt x="10800" y="21600"/>
+                </a:lnTo>
+                <a:lnTo>
+                  <a:pt x="21600" y="10800"/>
+                </a:lnTo>
+                <a:lnTo>
+                  <a:pt x="10800" y="0"/>
+                </a:lnTo>
+                <a:close/>
+              </a:path>
+            </a:pathLst>
+          </a:custGeom>
+          <a:solidFill>
+            <a:schemeClr val="accent4">
+              <a:hueOff val="475731"/>
+              <a:satOff val="-4338"/>
+              <a:lumOff val="10182"/>
+            </a:schemeClr>
+          </a:solidFill>
+          <a:ln w="12700">
+            <a:miter lim="400000"/>
+          </a:ln>
+          <a:extLst>
+            <a:ext uri="{C572A759-6A51-4108-AA02-DFA0A04FC94B}">
+              <ma14:wrappingTextBoxFlag xmlns:ma14="http://schemas.microsoft.com/office/mac/drawingml/2011/main" val="1"/>
+            </a:ext>
+          </a:extLst>
+        </p:spPr>
+        <p:txBody>
+          <a:bodyPr lIns="50800" tIns="50800" rIns="50800" bIns="50800" anchor="ctr"/>
+          <a:lstStyle>
+            <a:lvl1pPr defTabSz="825500">
+              <a:defRPr>
+                <a:solidFill>
+                  <a:srgbClr val="000000"/>
+                </a:solidFill>
+                <a:latin typeface="Helvetica Neue Medium"/>
+                <a:ea typeface="Helvetica Neue Medium"/>
+                <a:cs typeface="Helvetica Neue Medium"/>
+                <a:sym typeface="Helvetica Neue Medium"/>
+              </a:defRPr>
+            </a:lvl1pPr>
+          </a:lstStyle>
+          <a:p>
+            <a:pPr/>
+            <a:r>
+              <a:t>function</a:t>
+            </a:r>
+          </a:p>
+        </p:txBody>
+      </p:sp>
     </p:spTree>
   </p:cSld>
   <p:clrMapOvr>
@@ -4632,7 +5018,7 @@
       </p:grpSpPr>
       <p:sp>
         <p:nvSpPr>
-          <p:cNvPr id="165" name="Example: A Controlled Book"/>
+          <p:cNvPr id="170" name="Example: A Controlled Book"/>
           <p:cNvSpPr txBox="1"/>
           <p:nvPr>
             <p:ph type="title"/>
@@ -4656,7 +5042,7 @@
       </p:sp>
       <p:sp>
         <p:nvSpPr>
-          <p:cNvPr id="166" name="function App() {…"/>
+          <p:cNvPr id="171" name="function App() {…"/>
           <p:cNvSpPr txBox="1"/>
           <p:nvPr>
             <p:ph type="body" idx="1"/>
@@ -4803,7 +5189,7 @@
               </a:defRPr>
             </a:pPr>
             <a:r>
-              <a:t>)</a:t>
+              <a:t>);</a:t>
             </a:r>
           </a:p>
           <a:p>
@@ -4818,7 +5204,415 @@
               </a:defRPr>
             </a:pPr>
             <a:r>
-              <a:t>}</a:t>
+              <a:t>};</a:t>
+            </a:r>
+          </a:p>
+        </p:txBody>
+      </p:sp>
+      <p:sp>
+        <p:nvSpPr>
+          <p:cNvPr id="172" name="Book"/>
+          <p:cNvSpPr/>
+          <p:nvPr/>
+        </p:nvSpPr>
+        <p:spPr>
+          <a:xfrm>
+            <a:off x="20078900" y="11877903"/>
+            <a:ext cx="1524001" cy="762001"/>
+          </a:xfrm>
+          <a:custGeom>
+            <a:avLst/>
+            <a:gdLst/>
+            <a:ahLst/>
+            <a:cxnLst>
+              <a:cxn ang="0">
+                <a:pos x="wd2" y="hd2"/>
+              </a:cxn>
+              <a:cxn ang="5400000">
+                <a:pos x="wd2" y="hd2"/>
+              </a:cxn>
+              <a:cxn ang="10800000">
+                <a:pos x="wd2" y="hd2"/>
+              </a:cxn>
+              <a:cxn ang="16200000">
+                <a:pos x="wd2" y="hd2"/>
+              </a:cxn>
+            </a:cxnLst>
+            <a:rect l="0" t="0" r="r" b="b"/>
+            <a:pathLst>
+              <a:path w="21600" h="21600" fill="norm" stroke="1" extrusionOk="0">
+                <a:moveTo>
+                  <a:pt x="5400" y="0"/>
+                </a:moveTo>
+                <a:cubicBezTo>
+                  <a:pt x="2418" y="0"/>
+                  <a:pt x="0" y="4835"/>
+                  <a:pt x="0" y="10800"/>
+                </a:cubicBezTo>
+                <a:cubicBezTo>
+                  <a:pt x="0" y="16765"/>
+                  <a:pt x="2418" y="21600"/>
+                  <a:pt x="5400" y="21600"/>
+                </a:cubicBezTo>
+                <a:lnTo>
+                  <a:pt x="16200" y="21600"/>
+                </a:lnTo>
+                <a:cubicBezTo>
+                  <a:pt x="19182" y="21600"/>
+                  <a:pt x="21600" y="16765"/>
+                  <a:pt x="21600" y="10800"/>
+                </a:cubicBezTo>
+                <a:cubicBezTo>
+                  <a:pt x="21600" y="4835"/>
+                  <a:pt x="19182" y="0"/>
+                  <a:pt x="16200" y="0"/>
+                </a:cubicBezTo>
+                <a:lnTo>
+                  <a:pt x="5400" y="0"/>
+                </a:lnTo>
+                <a:close/>
+              </a:path>
+            </a:pathLst>
+          </a:custGeom>
+          <a:solidFill>
+            <a:srgbClr val="FFFFFF"/>
+          </a:solidFill>
+          <a:ln w="12700">
+            <a:miter lim="400000"/>
+          </a:ln>
+          <a:extLst>
+            <a:ext uri="{C572A759-6A51-4108-AA02-DFA0A04FC94B}">
+              <ma14:wrappingTextBoxFlag xmlns:ma14="http://schemas.microsoft.com/office/mac/drawingml/2011/main" val="1"/>
+            </a:ext>
+          </a:extLst>
+        </p:spPr>
+        <p:txBody>
+          <a:bodyPr lIns="50800" tIns="50800" rIns="50800" bIns="50800" anchor="ctr"/>
+          <a:lstStyle>
+            <a:lvl1pPr defTabSz="825500">
+              <a:defRPr sz="3200">
+                <a:solidFill>
+                  <a:srgbClr val="000000"/>
+                </a:solidFill>
+                <a:latin typeface="Helvetica Neue Medium"/>
+                <a:ea typeface="Helvetica Neue Medium"/>
+                <a:cs typeface="Helvetica Neue Medium"/>
+                <a:sym typeface="Helvetica Neue Medium"/>
+              </a:defRPr>
+            </a:lvl1pPr>
+          </a:lstStyle>
+          <a:p>
+            <a:pPr/>
+            <a:r>
+              <a:t>Book</a:t>
+            </a:r>
+          </a:p>
+        </p:txBody>
+      </p:sp>
+      <p:sp>
+        <p:nvSpPr>
+          <p:cNvPr id="173" name="App"/>
+          <p:cNvSpPr/>
+          <p:nvPr/>
+        </p:nvSpPr>
+        <p:spPr>
+          <a:xfrm>
+            <a:off x="19410005" y="2108555"/>
+            <a:ext cx="2861791" cy="1216261"/>
+          </a:xfrm>
+          <a:custGeom>
+            <a:avLst/>
+            <a:gdLst/>
+            <a:ahLst/>
+            <a:cxnLst>
+              <a:cxn ang="0">
+                <a:pos x="wd2" y="hd2"/>
+              </a:cxn>
+              <a:cxn ang="5400000">
+                <a:pos x="wd2" y="hd2"/>
+              </a:cxn>
+              <a:cxn ang="10800000">
+                <a:pos x="wd2" y="hd2"/>
+              </a:cxn>
+              <a:cxn ang="16200000">
+                <a:pos x="wd2" y="hd2"/>
+              </a:cxn>
+            </a:cxnLst>
+            <a:rect l="0" t="0" r="r" b="b"/>
+            <a:pathLst>
+              <a:path w="21600" h="21600" fill="norm" stroke="1" extrusionOk="0">
+                <a:moveTo>
+                  <a:pt x="2972" y="0"/>
+                </a:moveTo>
+                <a:lnTo>
+                  <a:pt x="0" y="21600"/>
+                </a:lnTo>
+                <a:lnTo>
+                  <a:pt x="21600" y="21600"/>
+                </a:lnTo>
+                <a:lnTo>
+                  <a:pt x="18627" y="0"/>
+                </a:lnTo>
+                <a:lnTo>
+                  <a:pt x="2972" y="0"/>
+                </a:lnTo>
+                <a:close/>
+              </a:path>
+            </a:pathLst>
+          </a:custGeom>
+          <a:solidFill>
+            <a:srgbClr val="FFFFFF"/>
+          </a:solidFill>
+          <a:ln w="12700">
+            <a:miter lim="400000"/>
+          </a:ln>
+          <a:extLst>
+            <a:ext uri="{C572A759-6A51-4108-AA02-DFA0A04FC94B}">
+              <ma14:wrappingTextBoxFlag xmlns:ma14="http://schemas.microsoft.com/office/mac/drawingml/2011/main" val="1"/>
+            </a:ext>
+          </a:extLst>
+        </p:spPr>
+        <p:txBody>
+          <a:bodyPr lIns="50800" tIns="50800" rIns="50800" bIns="50800" anchor="ctr"/>
+          <a:lstStyle>
+            <a:lvl1pPr defTabSz="825500">
+              <a:defRPr sz="3200">
+                <a:solidFill>
+                  <a:srgbClr val="000000"/>
+                </a:solidFill>
+                <a:latin typeface="Helvetica Neue Medium"/>
+                <a:ea typeface="Helvetica Neue Medium"/>
+                <a:cs typeface="Helvetica Neue Medium"/>
+                <a:sym typeface="Helvetica Neue Medium"/>
+              </a:defRPr>
+            </a:lvl1pPr>
+          </a:lstStyle>
+          <a:p>
+            <a:pPr/>
+            <a:r>
+              <a:t>App</a:t>
+            </a:r>
+          </a:p>
+        </p:txBody>
+      </p:sp>
+      <p:sp>
+        <p:nvSpPr>
+          <p:cNvPr id="174" name="Arrow"/>
+          <p:cNvSpPr/>
+          <p:nvPr/>
+        </p:nvSpPr>
+        <p:spPr>
+          <a:xfrm rot="5393452">
+            <a:off x="16569653" y="7277838"/>
+            <a:ext cx="8539388" cy="658539"/>
+          </a:xfrm>
+          <a:prstGeom prst="rightArrow">
+            <a:avLst>
+              <a:gd name="adj1" fmla="val 19930"/>
+              <a:gd name="adj2" fmla="val 118193"/>
+            </a:avLst>
+          </a:prstGeom>
+          <a:solidFill>
+            <a:schemeClr val="accent6"/>
+          </a:solidFill>
+          <a:ln w="12700">
+            <a:miter lim="400000"/>
+          </a:ln>
+        </p:spPr>
+        <p:txBody>
+          <a:bodyPr lIns="50800" tIns="50800" rIns="50800" bIns="50800" anchor="ctr"/>
+          <a:lstStyle/>
+          <a:p>
+            <a:pPr defTabSz="825500">
+              <a:defRPr sz="3200">
+                <a:solidFill>
+                  <a:srgbClr val="000000"/>
+                </a:solidFill>
+                <a:latin typeface="Helvetica Neue Medium"/>
+                <a:ea typeface="Helvetica Neue Medium"/>
+                <a:cs typeface="Helvetica Neue Medium"/>
+                <a:sym typeface="Helvetica Neue Medium"/>
+              </a:defRPr>
+            </a:pPr>
+          </a:p>
+        </p:txBody>
+      </p:sp>
+      <p:sp>
+        <p:nvSpPr>
+          <p:cNvPr id="175" name="the page state"/>
+          <p:cNvSpPr/>
+          <p:nvPr/>
+        </p:nvSpPr>
+        <p:spPr>
+          <a:xfrm>
+            <a:off x="20888010" y="4108977"/>
+            <a:ext cx="3394188" cy="1693381"/>
+          </a:xfrm>
+          <a:custGeom>
+            <a:avLst/>
+            <a:gdLst/>
+            <a:ahLst/>
+            <a:cxnLst>
+              <a:cxn ang="0">
+                <a:pos x="wd2" y="hd2"/>
+              </a:cxn>
+              <a:cxn ang="5400000">
+                <a:pos x="wd2" y="hd2"/>
+              </a:cxn>
+              <a:cxn ang="10800000">
+                <a:pos x="wd2" y="hd2"/>
+              </a:cxn>
+              <a:cxn ang="16200000">
+                <a:pos x="wd2" y="hd2"/>
+              </a:cxn>
+            </a:cxnLst>
+            <a:rect l="0" t="0" r="r" b="b"/>
+            <a:pathLst>
+              <a:path w="21600" h="21600" fill="norm" stroke="1" extrusionOk="0">
+                <a:moveTo>
+                  <a:pt x="10800" y="0"/>
+                </a:moveTo>
+                <a:lnTo>
+                  <a:pt x="0" y="10800"/>
+                </a:lnTo>
+                <a:lnTo>
+                  <a:pt x="10800" y="21600"/>
+                </a:lnTo>
+                <a:lnTo>
+                  <a:pt x="21600" y="10800"/>
+                </a:lnTo>
+                <a:lnTo>
+                  <a:pt x="10800" y="0"/>
+                </a:lnTo>
+                <a:close/>
+              </a:path>
+            </a:pathLst>
+          </a:custGeom>
+          <a:solidFill>
+            <a:schemeClr val="accent4">
+              <a:hueOff val="475731"/>
+              <a:satOff val="-4338"/>
+              <a:lumOff val="10182"/>
+            </a:schemeClr>
+          </a:solidFill>
+          <a:ln w="12700">
+            <a:miter lim="400000"/>
+          </a:ln>
+          <a:extLst>
+            <a:ext uri="{C572A759-6A51-4108-AA02-DFA0A04FC94B}">
+              <ma14:wrappingTextBoxFlag xmlns:ma14="http://schemas.microsoft.com/office/mac/drawingml/2011/main" val="1"/>
+            </a:ext>
+          </a:extLst>
+        </p:spPr>
+        <p:txBody>
+          <a:bodyPr lIns="50800" tIns="50800" rIns="50800" bIns="50800" anchor="ctr"/>
+          <a:lstStyle>
+            <a:lvl1pPr defTabSz="825500">
+              <a:defRPr>
+                <a:solidFill>
+                  <a:srgbClr val="000000"/>
+                </a:solidFill>
+                <a:latin typeface="Helvetica Neue Medium"/>
+                <a:ea typeface="Helvetica Neue Medium"/>
+                <a:cs typeface="Helvetica Neue Medium"/>
+                <a:sym typeface="Helvetica Neue Medium"/>
+              </a:defRPr>
+            </a:lvl1pPr>
+          </a:lstStyle>
+          <a:p>
+            <a:pPr/>
+            <a:r>
+              <a:t>the page state</a:t>
+            </a:r>
+          </a:p>
+        </p:txBody>
+      </p:sp>
+      <p:sp>
+        <p:nvSpPr>
+          <p:cNvPr id="176" name="a function that updates the page state"/>
+          <p:cNvSpPr/>
+          <p:nvPr/>
+        </p:nvSpPr>
+        <p:spPr>
+          <a:xfrm>
+            <a:off x="16245567" y="9236947"/>
+            <a:ext cx="4524796" cy="2257450"/>
+          </a:xfrm>
+          <a:custGeom>
+            <a:avLst/>
+            <a:gdLst/>
+            <a:ahLst/>
+            <a:cxnLst>
+              <a:cxn ang="0">
+                <a:pos x="wd2" y="hd2"/>
+              </a:cxn>
+              <a:cxn ang="5400000">
+                <a:pos x="wd2" y="hd2"/>
+              </a:cxn>
+              <a:cxn ang="10800000">
+                <a:pos x="wd2" y="hd2"/>
+              </a:cxn>
+              <a:cxn ang="16200000">
+                <a:pos x="wd2" y="hd2"/>
+              </a:cxn>
+            </a:cxnLst>
+            <a:rect l="0" t="0" r="r" b="b"/>
+            <a:pathLst>
+              <a:path w="21600" h="21600" fill="norm" stroke="1" extrusionOk="0">
+                <a:moveTo>
+                  <a:pt x="10800" y="0"/>
+                </a:moveTo>
+                <a:lnTo>
+                  <a:pt x="0" y="10800"/>
+                </a:lnTo>
+                <a:lnTo>
+                  <a:pt x="10800" y="21600"/>
+                </a:lnTo>
+                <a:lnTo>
+                  <a:pt x="21600" y="10800"/>
+                </a:lnTo>
+                <a:lnTo>
+                  <a:pt x="10800" y="0"/>
+                </a:lnTo>
+                <a:close/>
+              </a:path>
+            </a:pathLst>
+          </a:custGeom>
+          <a:solidFill>
+            <a:schemeClr val="accent4">
+              <a:hueOff val="475731"/>
+              <a:satOff val="-4338"/>
+              <a:lumOff val="10182"/>
+            </a:schemeClr>
+          </a:solidFill>
+          <a:ln w="12700">
+            <a:miter lim="400000"/>
+          </a:ln>
+          <a:extLst>
+            <a:ext uri="{C572A759-6A51-4108-AA02-DFA0A04FC94B}">
+              <ma14:wrappingTextBoxFlag xmlns:ma14="http://schemas.microsoft.com/office/mac/drawingml/2011/main" val="1"/>
+            </a:ext>
+          </a:extLst>
+        </p:spPr>
+        <p:txBody>
+          <a:bodyPr lIns="50800" tIns="50800" rIns="50800" bIns="50800" anchor="ctr"/>
+          <a:lstStyle>
+            <a:lvl1pPr defTabSz="825500">
+              <a:defRPr>
+                <a:solidFill>
+                  <a:srgbClr val="000000"/>
+                </a:solidFill>
+                <a:latin typeface="Helvetica Neue Medium"/>
+                <a:ea typeface="Helvetica Neue Medium"/>
+                <a:cs typeface="Helvetica Neue Medium"/>
+                <a:sym typeface="Helvetica Neue Medium"/>
+              </a:defRPr>
+            </a:lvl1pPr>
+          </a:lstStyle>
+          <a:p>
+            <a:pPr/>
+            <a:r>
+              <a:t>a function that updates the page state</a:t>
             </a:r>
           </a:p>
         </p:txBody>
@@ -4851,7 +5645,7 @@
       </p:grpSpPr>
       <p:sp>
         <p:nvSpPr>
-          <p:cNvPr id="168" name="Let’s try it 🧑💻"/>
+          <p:cNvPr id="178" name="Let’s try it 🧑💻"/>
           <p:cNvSpPr txBox="1"/>
           <p:nvPr>
             <p:ph type="body" sz="half" idx="1"/>
@@ -4901,7 +5695,7 @@
       </p:grpSpPr>
       <p:sp>
         <p:nvSpPr>
-          <p:cNvPr id="170" name="Let me know if you have any questions."/>
+          <p:cNvPr id="180" name="Let me know if you have any questions."/>
           <p:cNvSpPr txBox="1"/>
           <p:nvPr>
             <p:ph type="body" idx="21"/>
@@ -4930,7 +5724,7 @@
       </p:sp>
       <p:sp>
         <p:nvSpPr>
-          <p:cNvPr id="171" name="Thanks!"/>
+          <p:cNvPr id="181" name="Thanks!"/>
           <p:cNvSpPr txBox="1"/>
           <p:nvPr>
             <p:ph type="body" idx="1"/>

</xml_diff>